<commit_message>
move aws ec2 labs into aws-ec2-ebs labs
</commit_message>
<xml_diff>
--- a/aws-ec2/aws-ec2-ebs.pptx
+++ b/aws-ec2/aws-ec2-ebs.pptx
@@ -5,7 +5,7 @@
     <p:sldMasterId id="2147483677" r:id="rId1"/>
   </p:sldMasterIdLst>
   <p:notesMasterIdLst>
-    <p:notesMasterId r:id="rId13"/>
+    <p:notesMasterId r:id="rId12"/>
   </p:notesMasterIdLst>
   <p:sldIdLst>
     <p:sldId id="256" r:id="rId2"/>
@@ -18,7 +18,6 @@
     <p:sldId id="308" r:id="rId9"/>
     <p:sldId id="309" r:id="rId10"/>
     <p:sldId id="310" r:id="rId11"/>
-    <p:sldId id="292" r:id="rId12"/>
   </p:sldIdLst>
   <p:sldSz cx="9144000" cy="6858000" type="screen4x3"/>
   <p:notesSz cx="6858000" cy="9144000"/>
@@ -218,7 +217,7 @@
           <a:p>
             <a:fld id="{1B6676A5-1300-B945-98B1-DD92DDC3A3CB}" type="datetimeFigureOut">
               <a:rPr lang="en-US" smtClean="0"/>
-              <a:t>11/22/15</a:t>
+              <a:t>12/1/15</a:t>
             </a:fld>
             <a:endParaRPr lang="en-US"/>
           </a:p>
@@ -648,132 +647,6 @@
 </p:notes>
 </file>
 
-<file path=ppt/notesSlides/notesSlide10.xml><?xml version="1.0" encoding="utf-8"?>
-<p:notes xmlns:a="http://schemas.openxmlformats.org/drawingml/2006/main" xmlns:r="http://schemas.openxmlformats.org/officeDocument/2006/relationships" xmlns:p="http://schemas.openxmlformats.org/presentationml/2006/main">
-  <p:cSld>
-    <p:spTree>
-      <p:nvGrpSpPr>
-        <p:cNvPr id="1" name=""/>
-        <p:cNvGrpSpPr/>
-        <p:nvPr/>
-      </p:nvGrpSpPr>
-      <p:grpSpPr>
-        <a:xfrm>
-          <a:off x="0" y="0"/>
-          <a:ext cx="0" cy="0"/>
-          <a:chOff x="0" y="0"/>
-          <a:chExt cx="0" cy="0"/>
-        </a:xfrm>
-      </p:grpSpPr>
-      <p:sp>
-        <p:nvSpPr>
-          <p:cNvPr id="2" name="Slide Image Placeholder 1"/>
-          <p:cNvSpPr>
-            <a:spLocks noGrp="1" noRot="1" noChangeAspect="1"/>
-          </p:cNvSpPr>
-          <p:nvPr>
-            <p:ph type="sldImg"/>
-          </p:nvPr>
-        </p:nvSpPr>
-        <p:spPr/>
-      </p:sp>
-      <p:sp>
-        <p:nvSpPr>
-          <p:cNvPr id="3" name="Notes Placeholder 2"/>
-          <p:cNvSpPr>
-            <a:spLocks noGrp="1"/>
-          </p:cNvSpPr>
-          <p:nvPr>
-            <p:ph type="body" idx="1"/>
-          </p:nvPr>
-        </p:nvSpPr>
-        <p:spPr/>
-        <p:txBody>
-          <a:bodyPr/>
-          <a:lstStyle/>
-          <a:p>
-            <a:r>
-              <a:rPr lang="en-US" dirty="0" smtClean="0"/>
-              <a:t>Reference:</a:t>
-            </a:r>
-          </a:p>
-          <a:p>
-            <a:pPr marL="171450" indent="-171450">
-              <a:buFont typeface="Arial"/>
-              <a:buChar char="•"/>
-            </a:pPr>
-            <a:r>
-              <a:rPr lang="en-US" dirty="0" smtClean="0"/>
-              <a:t>http://</a:t>
-            </a:r>
-            <a:r>
-              <a:rPr lang="en-US" dirty="0" err="1" smtClean="0"/>
-              <a:t>docs.aws.amazon.com</a:t>
-            </a:r>
-            <a:r>
-              <a:rPr lang="en-US" dirty="0" smtClean="0"/>
-              <a:t>/AWSEC2/latest/</a:t>
-            </a:r>
-            <a:r>
-              <a:rPr lang="en-US" dirty="0" err="1" smtClean="0"/>
-              <a:t>UserGuide</a:t>
-            </a:r>
-            <a:r>
-              <a:rPr lang="en-US" dirty="0" smtClean="0"/>
-              <a:t>/</a:t>
-            </a:r>
-            <a:r>
-              <a:rPr lang="en-US" dirty="0" err="1" smtClean="0"/>
-              <a:t>ebs</a:t>
-            </a:r>
-            <a:r>
-              <a:rPr lang="en-US" dirty="0" smtClean="0"/>
-              <a:t>-using-</a:t>
-            </a:r>
-            <a:r>
-              <a:rPr lang="en-US" dirty="0" err="1" smtClean="0"/>
-              <a:t>volumes.html</a:t>
-            </a:r>
-            <a:endParaRPr lang="en-US" dirty="0"/>
-          </a:p>
-        </p:txBody>
-      </p:sp>
-      <p:sp>
-        <p:nvSpPr>
-          <p:cNvPr id="4" name="Slide Number Placeholder 3"/>
-          <p:cNvSpPr>
-            <a:spLocks noGrp="1"/>
-          </p:cNvSpPr>
-          <p:nvPr>
-            <p:ph type="sldNum" sz="quarter" idx="10"/>
-          </p:nvPr>
-        </p:nvSpPr>
-        <p:spPr/>
-        <p:txBody>
-          <a:bodyPr/>
-          <a:lstStyle/>
-          <a:p>
-            <a:fld id="{BFB43062-714D-1146-A97F-0D45BD9E7BF0}" type="slidenum">
-              <a:rPr lang="en-US" smtClean="0"/>
-              <a:t>11</a:t>
-            </a:fld>
-            <a:endParaRPr lang="en-US"/>
-          </a:p>
-        </p:txBody>
-      </p:sp>
-    </p:spTree>
-    <p:extLst>
-      <p:ext uri="{BB962C8B-B14F-4D97-AF65-F5344CB8AC3E}">
-        <p14:creationId xmlns:p14="http://schemas.microsoft.com/office/powerpoint/2010/main" val="494559740"/>
-      </p:ext>
-    </p:extLst>
-  </p:cSld>
-  <p:clrMapOvr>
-    <a:masterClrMapping/>
-  </p:clrMapOvr>
-</p:notes>
-</file>
-
 <file path=ppt/notesSlides/notesSlide2.xml><?xml version="1.0" encoding="utf-8"?>
 <p:notes xmlns:a="http://schemas.openxmlformats.org/drawingml/2006/main" xmlns:r="http://schemas.openxmlformats.org/officeDocument/2006/relationships" xmlns:p="http://schemas.openxmlformats.org/presentationml/2006/main">
   <p:cSld>
@@ -3712,7 +3585,7 @@
           <a:p>
             <a:fld id="{7CE38E4D-051A-41E1-86A4-E56916468FD0}" type="datetimeFigureOut">
               <a:rPr lang="en-US" smtClean="0"/>
-              <a:t>11/22/15</a:t>
+              <a:t>12/1/15</a:t>
             </a:fld>
             <a:endParaRPr lang="en-US"/>
           </a:p>
@@ -3893,7 +3766,7 @@
           <a:p>
             <a:fld id="{7CE38E4D-051A-41E1-86A4-E56916468FD0}" type="datetimeFigureOut">
               <a:rPr lang="en-US" smtClean="0"/>
-              <a:t>11/22/15</a:t>
+              <a:t>12/1/15</a:t>
             </a:fld>
             <a:endParaRPr lang="en-US"/>
           </a:p>
@@ -4044,7 +3917,7 @@
           <a:p>
             <a:fld id="{7CE38E4D-051A-41E1-86A4-E56916468FD0}" type="datetimeFigureOut">
               <a:rPr lang="en-US" smtClean="0"/>
-              <a:t>11/22/15</a:t>
+              <a:t>12/1/15</a:t>
             </a:fld>
             <a:endParaRPr lang="en-US"/>
           </a:p>
@@ -5870,7 +5743,7 @@
           <a:p>
             <a:fld id="{7CE38E4D-051A-41E1-86A4-E56916468FD0}" type="datetimeFigureOut">
               <a:rPr lang="en-US" smtClean="0"/>
-              <a:t>11/22/15</a:t>
+              <a:t>12/1/15</a:t>
             </a:fld>
             <a:endParaRPr lang="en-US"/>
           </a:p>
@@ -7740,7 +7613,7 @@
           <a:p>
             <a:fld id="{7CE38E4D-051A-41E1-86A4-E56916468FD0}" type="datetimeFigureOut">
               <a:rPr lang="en-US" smtClean="0"/>
-              <a:t>11/22/15</a:t>
+              <a:t>12/1/15</a:t>
             </a:fld>
             <a:endParaRPr lang="en-US"/>
           </a:p>
@@ -7853,7 +7726,7 @@
           <a:p>
             <a:fld id="{7CE38E4D-051A-41E1-86A4-E56916468FD0}" type="datetimeFigureOut">
               <a:rPr lang="en-US" smtClean="0"/>
-              <a:t>11/22/15</a:t>
+              <a:t>12/1/15</a:t>
             </a:fld>
             <a:endParaRPr lang="en-US"/>
           </a:p>
@@ -8394,7 +8267,7 @@
           <a:p>
             <a:fld id="{7CE38E4D-051A-41E1-86A4-E56916468FD0}" type="datetimeFigureOut">
               <a:rPr lang="en-US" smtClean="0"/>
-              <a:t>11/22/15</a:t>
+              <a:t>12/1/15</a:t>
             </a:fld>
             <a:endParaRPr lang="en-US"/>
           </a:p>
@@ -8507,7 +8380,7 @@
           <a:p>
             <a:fld id="{7CE38E4D-051A-41E1-86A4-E56916468FD0}" type="datetimeFigureOut">
               <a:rPr lang="en-US" smtClean="0"/>
-              <a:t>11/22/15</a:t>
+              <a:t>12/1/15</a:t>
             </a:fld>
             <a:endParaRPr lang="en-US"/>
           </a:p>
@@ -10218,7 +10091,7 @@
           <a:p>
             <a:fld id="{7CE38E4D-051A-41E1-86A4-E56916468FD0}" type="datetimeFigureOut">
               <a:rPr lang="en-US" smtClean="0"/>
-              <a:t>11/22/15</a:t>
+              <a:t>12/1/15</a:t>
             </a:fld>
             <a:endParaRPr lang="en-US"/>
           </a:p>
@@ -10369,7 +10242,7 @@
           <a:p>
             <a:fld id="{7CE38E4D-051A-41E1-86A4-E56916468FD0}" type="datetimeFigureOut">
               <a:rPr lang="en-US" smtClean="0"/>
-              <a:t>11/22/15</a:t>
+              <a:t>12/1/15</a:t>
             </a:fld>
             <a:endParaRPr lang="en-US"/>
           </a:p>
@@ -13984,7 +13857,7 @@
           <a:p>
             <a:fld id="{7CE38E4D-051A-41E1-86A4-E56916468FD0}" type="datetimeFigureOut">
               <a:rPr lang="en-US" smtClean="0"/>
-              <a:t>11/22/15</a:t>
+              <a:t>12/1/15</a:t>
             </a:fld>
             <a:endParaRPr lang="en-US"/>
           </a:p>
@@ -15843,7 +15716,7 @@
           <a:p>
             <a:fld id="{7CE38E4D-051A-41E1-86A4-E56916468FD0}" type="datetimeFigureOut">
               <a:rPr lang="en-US" smtClean="0"/>
-              <a:t>11/22/15</a:t>
+              <a:t>12/1/15</a:t>
             </a:fld>
             <a:endParaRPr lang="en-US"/>
           </a:p>
@@ -16550,140 +16423,6 @@
     <p:extLst>
       <p:ext uri="{BB962C8B-B14F-4D97-AF65-F5344CB8AC3E}">
         <p14:creationId xmlns:p14="http://schemas.microsoft.com/office/powerpoint/2010/main" val="2365770770"/>
-      </p:ext>
-    </p:extLst>
-  </p:cSld>
-  <p:clrMapOvr>
-    <a:masterClrMapping/>
-  </p:clrMapOvr>
-  <p:timing>
-    <p:tnLst>
-      <p:par>
-        <p:cTn id="1" dur="indefinite" restart="never" nodeType="tmRoot"/>
-      </p:par>
-    </p:tnLst>
-  </p:timing>
-</p:sld>
-</file>
-
-<file path=ppt/slides/slide11.xml><?xml version="1.0" encoding="utf-8"?>
-<p:sld xmlns:a="http://schemas.openxmlformats.org/drawingml/2006/main" xmlns:r="http://schemas.openxmlformats.org/officeDocument/2006/relationships" xmlns:p="http://schemas.openxmlformats.org/presentationml/2006/main">
-  <p:cSld>
-    <p:spTree>
-      <p:nvGrpSpPr>
-        <p:cNvPr id="1" name=""/>
-        <p:cNvGrpSpPr/>
-        <p:nvPr/>
-      </p:nvGrpSpPr>
-      <p:grpSpPr>
-        <a:xfrm>
-          <a:off x="0" y="0"/>
-          <a:ext cx="0" cy="0"/>
-          <a:chOff x="0" y="0"/>
-          <a:chExt cx="0" cy="0"/>
-        </a:xfrm>
-      </p:grpSpPr>
-      <p:sp>
-        <p:nvSpPr>
-          <p:cNvPr id="3" name="Content Placeholder 2"/>
-          <p:cNvSpPr>
-            <a:spLocks noGrp="1"/>
-          </p:cNvSpPr>
-          <p:nvPr>
-            <p:ph idx="1"/>
-          </p:nvPr>
-        </p:nvSpPr>
-        <p:spPr/>
-        <p:txBody>
-          <a:bodyPr>
-            <a:normAutofit/>
-          </a:bodyPr>
-          <a:lstStyle/>
-          <a:p>
-            <a:r>
-              <a:rPr lang="en-US" dirty="0" smtClean="0"/>
-              <a:t>Create an EBS Volume (20 GB in size)</a:t>
-            </a:r>
-          </a:p>
-          <a:p>
-            <a:r>
-              <a:rPr lang="en-US" dirty="0" smtClean="0"/>
-              <a:t>Attach to the www-</a:t>
-            </a:r>
-            <a:r>
-              <a:rPr lang="en-US" dirty="0" err="1" smtClean="0"/>
-              <a:t>youname</a:t>
-            </a:r>
-            <a:r>
-              <a:rPr lang="en-US" dirty="0" smtClean="0"/>
-              <a:t> Instance</a:t>
-            </a:r>
-          </a:p>
-          <a:p>
-            <a:r>
-              <a:rPr lang="en-US" dirty="0" smtClean="0"/>
-              <a:t>Format the newly created EBS Volume</a:t>
-            </a:r>
-          </a:p>
-          <a:p>
-            <a:r>
-              <a:rPr lang="en-US" dirty="0" smtClean="0"/>
-              <a:t>Add data to the new EBS Volume</a:t>
-            </a:r>
-          </a:p>
-          <a:p>
-            <a:r>
-              <a:rPr lang="en-US" dirty="0" smtClean="0"/>
-              <a:t>Snapshot the new EBS volume</a:t>
-            </a:r>
-          </a:p>
-          <a:p>
-            <a:r>
-              <a:rPr lang="en-US" dirty="0" smtClean="0"/>
-              <a:t>Restore the EBS volume (60 GB in size, 1800 IOPS)</a:t>
-            </a:r>
-          </a:p>
-          <a:p>
-            <a:pPr marL="0" indent="0">
-              <a:buNone/>
-            </a:pPr>
-            <a:endParaRPr lang="en-US" dirty="0" smtClean="0"/>
-          </a:p>
-        </p:txBody>
-      </p:sp>
-      <p:sp>
-        <p:nvSpPr>
-          <p:cNvPr id="2" name="Title 1"/>
-          <p:cNvSpPr>
-            <a:spLocks noGrp="1"/>
-          </p:cNvSpPr>
-          <p:nvPr>
-            <p:ph type="title"/>
-          </p:nvPr>
-        </p:nvSpPr>
-        <p:spPr/>
-        <p:txBody>
-          <a:bodyPr>
-            <a:normAutofit fontScale="90000"/>
-          </a:bodyPr>
-          <a:lstStyle/>
-          <a:p>
-            <a:r>
-              <a:rPr lang="en-US" dirty="0" smtClean="0"/>
-              <a:t>Lab: </a:t>
-            </a:r>
-            <a:r>
-              <a:rPr lang="en-US" dirty="0" smtClean="0"/>
-              <a:t>Create, Snapshot and Resize EBS</a:t>
-            </a:r>
-            <a:endParaRPr lang="en-US" dirty="0"/>
-          </a:p>
-        </p:txBody>
-      </p:sp>
-    </p:spTree>
-    <p:extLst>
-      <p:ext uri="{BB962C8B-B14F-4D97-AF65-F5344CB8AC3E}">
-        <p14:creationId xmlns:p14="http://schemas.microsoft.com/office/powerpoint/2010/main" val="1488925175"/>
       </p:ext>
     </p:extLst>
   </p:cSld>

</xml_diff>

<commit_message>
updates for aws ec2 ebs
</commit_message>
<xml_diff>
--- a/aws-ec2/aws-ec2-ebs.pptx
+++ b/aws-ec2/aws-ec2-ebs.pptx
@@ -217,7 +217,7 @@
           <a:p>
             <a:fld id="{1B6676A5-1300-B945-98B1-DD92DDC3A3CB}" type="datetimeFigureOut">
               <a:rPr lang="en-US" smtClean="0"/>
-              <a:t>12/1/15</a:t>
+              <a:t>12/2/15</a:t>
             </a:fld>
             <a:endParaRPr lang="en-US"/>
           </a:p>
@@ -1170,7 +1170,50 @@
             </a:pPr>
             <a:r>
               <a:rPr lang="en-US" baseline="0" dirty="0" smtClean="0"/>
-              <a:t>SDD416, Douglass </a:t>
+              <a:t>https://</a:t>
+            </a:r>
+            <a:r>
+              <a:rPr lang="en-US" baseline="0" dirty="0" err="1" smtClean="0"/>
+              <a:t>aws.amazon.com</a:t>
+            </a:r>
+            <a:r>
+              <a:rPr lang="en-US" baseline="0" dirty="0" smtClean="0"/>
+              <a:t>/</a:t>
+            </a:r>
+            <a:r>
+              <a:rPr lang="en-US" baseline="0" dirty="0" err="1" smtClean="0"/>
+              <a:t>ebs</a:t>
+            </a:r>
+            <a:r>
+              <a:rPr lang="en-US" baseline="0" dirty="0" smtClean="0"/>
+              <a:t>/details/</a:t>
+            </a:r>
+          </a:p>
+          <a:p>
+            <a:pPr marL="171450" marR="0" indent="-171450" algn="l" defTabSz="457200" rtl="0" eaLnBrk="1" fontAlgn="auto" latinLnBrk="0" hangingPunct="1">
+              <a:lnSpc>
+                <a:spcPct val="100000"/>
+              </a:lnSpc>
+              <a:spcBef>
+                <a:spcPts val="0"/>
+              </a:spcBef>
+              <a:spcAft>
+                <a:spcPts val="0"/>
+              </a:spcAft>
+              <a:buClrTx/>
+              <a:buSzTx/>
+              <a:buFont typeface="Arial"/>
+              <a:buChar char="•"/>
+              <a:tabLst/>
+              <a:defRPr/>
+            </a:pPr>
+            <a:r>
+              <a:rPr lang="en-US" baseline="0" dirty="0" smtClean="0"/>
+              <a:t>SDD416</a:t>
+            </a:r>
+            <a:r>
+              <a:rPr lang="en-US" baseline="0" dirty="0" smtClean="0"/>
+              <a:t>, Douglass </a:t>
             </a:r>
             <a:r>
               <a:rPr lang="en-US" baseline="0" dirty="0" err="1" smtClean="0"/>
@@ -1186,8 +1229,32 @@
             </a:r>
             <a:r>
               <a:rPr lang="en-US" baseline="0" dirty="0" smtClean="0"/>
-              <a:t> 2014</a:t>
-            </a:r>
+              <a:t> </a:t>
+            </a:r>
+            <a:r>
+              <a:rPr lang="en-US" baseline="0" dirty="0" smtClean="0"/>
+              <a:t>2014</a:t>
+            </a:r>
+          </a:p>
+          <a:p>
+            <a:pPr marL="171450" marR="0" indent="-171450" algn="l" defTabSz="457200" rtl="0" eaLnBrk="1" fontAlgn="auto" latinLnBrk="0" hangingPunct="1">
+              <a:lnSpc>
+                <a:spcPct val="100000"/>
+              </a:lnSpc>
+              <a:spcBef>
+                <a:spcPts val="0"/>
+              </a:spcBef>
+              <a:spcAft>
+                <a:spcPts val="0"/>
+              </a:spcAft>
+              <a:buClrTx/>
+              <a:buSzTx/>
+              <a:buFont typeface="Arial"/>
+              <a:buChar char="•"/>
+              <a:tabLst/>
+              <a:defRPr/>
+            </a:pPr>
+            <a:endParaRPr lang="en-US" baseline="0" dirty="0" smtClean="0"/>
           </a:p>
         </p:txBody>
       </p:sp>
@@ -3585,7 +3652,7 @@
           <a:p>
             <a:fld id="{7CE38E4D-051A-41E1-86A4-E56916468FD0}" type="datetimeFigureOut">
               <a:rPr lang="en-US" smtClean="0"/>
-              <a:t>12/1/15</a:t>
+              <a:t>12/2/15</a:t>
             </a:fld>
             <a:endParaRPr lang="en-US"/>
           </a:p>
@@ -3766,7 +3833,7 @@
           <a:p>
             <a:fld id="{7CE38E4D-051A-41E1-86A4-E56916468FD0}" type="datetimeFigureOut">
               <a:rPr lang="en-US" smtClean="0"/>
-              <a:t>12/1/15</a:t>
+              <a:t>12/2/15</a:t>
             </a:fld>
             <a:endParaRPr lang="en-US"/>
           </a:p>
@@ -3917,7 +3984,7 @@
           <a:p>
             <a:fld id="{7CE38E4D-051A-41E1-86A4-E56916468FD0}" type="datetimeFigureOut">
               <a:rPr lang="en-US" smtClean="0"/>
-              <a:t>12/1/15</a:t>
+              <a:t>12/2/15</a:t>
             </a:fld>
             <a:endParaRPr lang="en-US"/>
           </a:p>
@@ -5743,7 +5810,7 @@
           <a:p>
             <a:fld id="{7CE38E4D-051A-41E1-86A4-E56916468FD0}" type="datetimeFigureOut">
               <a:rPr lang="en-US" smtClean="0"/>
-              <a:t>12/1/15</a:t>
+              <a:t>12/2/15</a:t>
             </a:fld>
             <a:endParaRPr lang="en-US"/>
           </a:p>
@@ -7613,7 +7680,7 @@
           <a:p>
             <a:fld id="{7CE38E4D-051A-41E1-86A4-E56916468FD0}" type="datetimeFigureOut">
               <a:rPr lang="en-US" smtClean="0"/>
-              <a:t>12/1/15</a:t>
+              <a:t>12/2/15</a:t>
             </a:fld>
             <a:endParaRPr lang="en-US"/>
           </a:p>
@@ -7726,7 +7793,7 @@
           <a:p>
             <a:fld id="{7CE38E4D-051A-41E1-86A4-E56916468FD0}" type="datetimeFigureOut">
               <a:rPr lang="en-US" smtClean="0"/>
-              <a:t>12/1/15</a:t>
+              <a:t>12/2/15</a:t>
             </a:fld>
             <a:endParaRPr lang="en-US"/>
           </a:p>
@@ -8267,7 +8334,7 @@
           <a:p>
             <a:fld id="{7CE38E4D-051A-41E1-86A4-E56916468FD0}" type="datetimeFigureOut">
               <a:rPr lang="en-US" smtClean="0"/>
-              <a:t>12/1/15</a:t>
+              <a:t>12/2/15</a:t>
             </a:fld>
             <a:endParaRPr lang="en-US"/>
           </a:p>
@@ -8380,7 +8447,7 @@
           <a:p>
             <a:fld id="{7CE38E4D-051A-41E1-86A4-E56916468FD0}" type="datetimeFigureOut">
               <a:rPr lang="en-US" smtClean="0"/>
-              <a:t>12/1/15</a:t>
+              <a:t>12/2/15</a:t>
             </a:fld>
             <a:endParaRPr lang="en-US"/>
           </a:p>
@@ -10091,7 +10158,7 @@
           <a:p>
             <a:fld id="{7CE38E4D-051A-41E1-86A4-E56916468FD0}" type="datetimeFigureOut">
               <a:rPr lang="en-US" smtClean="0"/>
-              <a:t>12/1/15</a:t>
+              <a:t>12/2/15</a:t>
             </a:fld>
             <a:endParaRPr lang="en-US"/>
           </a:p>
@@ -10242,7 +10309,7 @@
           <a:p>
             <a:fld id="{7CE38E4D-051A-41E1-86A4-E56916468FD0}" type="datetimeFigureOut">
               <a:rPr lang="en-US" smtClean="0"/>
-              <a:t>12/1/15</a:t>
+              <a:t>12/2/15</a:t>
             </a:fld>
             <a:endParaRPr lang="en-US"/>
           </a:p>
@@ -13857,7 +13924,7 @@
           <a:p>
             <a:fld id="{7CE38E4D-051A-41E1-86A4-E56916468FD0}" type="datetimeFigureOut">
               <a:rPr lang="en-US" smtClean="0"/>
-              <a:t>12/1/15</a:t>
+              <a:t>12/2/15</a:t>
             </a:fld>
             <a:endParaRPr lang="en-US"/>
           </a:p>
@@ -15716,7 +15783,7 @@
           <a:p>
             <a:fld id="{7CE38E4D-051A-41E1-86A4-E56916468FD0}" type="datetimeFigureOut">
               <a:rPr lang="en-US" smtClean="0"/>
-              <a:t>12/1/15</a:t>
+              <a:t>12/2/15</a:t>
             </a:fld>
             <a:endParaRPr lang="en-US"/>
           </a:p>
@@ -16985,13 +17052,25 @@
             </a:r>
             <a:r>
               <a:rPr lang="en-US" dirty="0" smtClean="0"/>
-              <a:t> volume * price/GB/month</a:t>
-            </a:r>
-          </a:p>
-          <a:p>
+              <a:t> volume * </a:t>
+            </a:r>
             <a:r>
               <a:rPr lang="en-US" dirty="0" smtClean="0"/>
-              <a:t>Subsequent Snapshots = difference * price/GB/month</a:t>
+              <a:t>price per “Gigabyte Month” of data stored</a:t>
+            </a:r>
+          </a:p>
+          <a:p>
+            <a:r>
+              <a:rPr lang="en-US" dirty="0" smtClean="0"/>
+              <a:t>Subsequent </a:t>
+            </a:r>
+            <a:r>
+              <a:rPr lang="en-US" dirty="0" smtClean="0"/>
+              <a:t>Snapshots = difference * </a:t>
+            </a:r>
+            <a:r>
+              <a:rPr lang="en-US" dirty="0"/>
+              <a:t>“Gigabyte Month” of data stored</a:t>
             </a:r>
           </a:p>
           <a:p>
@@ -17250,7 +17329,7 @@
         <p:spPr/>
         <p:txBody>
           <a:bodyPr>
-            <a:normAutofit lnSpcReduction="10000"/>
+            <a:normAutofit/>
           </a:bodyPr>
           <a:lstStyle/>
           <a:p>
@@ -17274,22 +17353,21 @@
             <a:pPr lvl="1"/>
             <a:r>
               <a:rPr lang="en-US" dirty="0" smtClean="0"/>
-              <a:t>Maximum 48,000 IOPS @ 16K 10, limited by 10 </a:t>
-            </a:r>
-            <a:r>
-              <a:rPr lang="en-US" dirty="0" err="1" smtClean="0"/>
-              <a:t>Gbps</a:t>
+              <a:t>Maximum 48,000 </a:t>
             </a:r>
             <a:r>
               <a:rPr lang="en-US" dirty="0" smtClean="0"/>
-              <a:t> Network</a:t>
-            </a:r>
-            <a:endParaRPr lang="en-US" dirty="0"/>
+              <a:t>IOPS</a:t>
+            </a:r>
           </a:p>
           <a:p>
             <a:r>
               <a:rPr lang="en-US" dirty="0" smtClean="0"/>
-              <a:t>EBS-Optimized Instances:</a:t>
+              <a:t>EBS-Optimized </a:t>
+            </a:r>
+            <a:r>
+              <a:rPr lang="en-US" dirty="0" smtClean="0"/>
+              <a:t>Instances:</a:t>
             </a:r>
           </a:p>
           <a:p>

</xml_diff>